<commit_message>
Should be mostly done now
Mostly filled skeleton deck and added top 10 variables for remaining 2 models, since variance between training sets of the models will lead to different importance values.
</commit_message>
<xml_diff>
--- a/skeleton_deck.pptx
+++ b/skeleton_deck.pptx
@@ -265,9 +265,9 @@
           <a:p>
             <a:fld id="{6FCE017E-20F9-AD48-8C62-632CB67C5F5C}" type="datetimeFigureOut">
               <a:rPr lang="en-US" smtClean="0"/>
-              <a:t>11/13/2021</a:t>
+              <a:t>11/14/2021</a:t>
             </a:fld>
-            <a:endParaRPr lang="en-US"/>
+            <a:endParaRPr lang="en-US" dirty="0"/>
           </a:p>
         </p:txBody>
       </p:sp>
@@ -292,7 +292,7 @@
           <a:bodyPr/>
           <a:lstStyle/>
           <a:p>
-            <a:endParaRPr lang="en-US"/>
+            <a:endParaRPr lang="en-US" dirty="0"/>
           </a:p>
         </p:txBody>
       </p:sp>
@@ -321,7 +321,7 @@
               <a:rPr lang="en-US" smtClean="0"/>
               <a:t>‹#›</a:t>
             </a:fld>
-            <a:endParaRPr lang="en-US"/>
+            <a:endParaRPr lang="en-US" dirty="0"/>
           </a:p>
         </p:txBody>
       </p:sp>
@@ -463,9 +463,9 @@
           <a:p>
             <a:fld id="{6FCE017E-20F9-AD48-8C62-632CB67C5F5C}" type="datetimeFigureOut">
               <a:rPr lang="en-US" smtClean="0"/>
-              <a:t>11/13/2021</a:t>
+              <a:t>11/14/2021</a:t>
             </a:fld>
-            <a:endParaRPr lang="en-US"/>
+            <a:endParaRPr lang="en-US" dirty="0"/>
           </a:p>
         </p:txBody>
       </p:sp>
@@ -490,7 +490,7 @@
           <a:bodyPr/>
           <a:lstStyle/>
           <a:p>
-            <a:endParaRPr lang="en-US"/>
+            <a:endParaRPr lang="en-US" dirty="0"/>
           </a:p>
         </p:txBody>
       </p:sp>
@@ -519,7 +519,7 @@
               <a:rPr lang="en-US" smtClean="0"/>
               <a:t>‹#›</a:t>
             </a:fld>
-            <a:endParaRPr lang="en-US"/>
+            <a:endParaRPr lang="en-US" dirty="0"/>
           </a:p>
         </p:txBody>
       </p:sp>
@@ -671,9 +671,9 @@
           <a:p>
             <a:fld id="{6FCE017E-20F9-AD48-8C62-632CB67C5F5C}" type="datetimeFigureOut">
               <a:rPr lang="en-US" smtClean="0"/>
-              <a:t>11/13/2021</a:t>
+              <a:t>11/14/2021</a:t>
             </a:fld>
-            <a:endParaRPr lang="en-US"/>
+            <a:endParaRPr lang="en-US" dirty="0"/>
           </a:p>
         </p:txBody>
       </p:sp>
@@ -698,7 +698,7 @@
           <a:bodyPr/>
           <a:lstStyle/>
           <a:p>
-            <a:endParaRPr lang="en-US"/>
+            <a:endParaRPr lang="en-US" dirty="0"/>
           </a:p>
         </p:txBody>
       </p:sp>
@@ -727,7 +727,7 @@
               <a:rPr lang="en-US" smtClean="0"/>
               <a:t>‹#›</a:t>
             </a:fld>
-            <a:endParaRPr lang="en-US"/>
+            <a:endParaRPr lang="en-US" dirty="0"/>
           </a:p>
         </p:txBody>
       </p:sp>
@@ -869,9 +869,9 @@
           <a:p>
             <a:fld id="{6FCE017E-20F9-AD48-8C62-632CB67C5F5C}" type="datetimeFigureOut">
               <a:rPr lang="en-US" smtClean="0"/>
-              <a:t>11/13/2021</a:t>
+              <a:t>11/14/2021</a:t>
             </a:fld>
-            <a:endParaRPr lang="en-US"/>
+            <a:endParaRPr lang="en-US" dirty="0"/>
           </a:p>
         </p:txBody>
       </p:sp>
@@ -896,7 +896,7 @@
           <a:bodyPr/>
           <a:lstStyle/>
           <a:p>
-            <a:endParaRPr lang="en-US"/>
+            <a:endParaRPr lang="en-US" dirty="0"/>
           </a:p>
         </p:txBody>
       </p:sp>
@@ -925,7 +925,7 @@
               <a:rPr lang="en-US" smtClean="0"/>
               <a:t>‹#›</a:t>
             </a:fld>
-            <a:endParaRPr lang="en-US"/>
+            <a:endParaRPr lang="en-US" dirty="0"/>
           </a:p>
         </p:txBody>
       </p:sp>
@@ -1144,9 +1144,9 @@
           <a:p>
             <a:fld id="{6FCE017E-20F9-AD48-8C62-632CB67C5F5C}" type="datetimeFigureOut">
               <a:rPr lang="en-US" smtClean="0"/>
-              <a:t>11/13/2021</a:t>
+              <a:t>11/14/2021</a:t>
             </a:fld>
-            <a:endParaRPr lang="en-US"/>
+            <a:endParaRPr lang="en-US" dirty="0"/>
           </a:p>
         </p:txBody>
       </p:sp>
@@ -1171,7 +1171,7 @@
           <a:bodyPr/>
           <a:lstStyle/>
           <a:p>
-            <a:endParaRPr lang="en-US"/>
+            <a:endParaRPr lang="en-US" dirty="0"/>
           </a:p>
         </p:txBody>
       </p:sp>
@@ -1200,7 +1200,7 @@
               <a:rPr lang="en-US" smtClean="0"/>
               <a:t>‹#›</a:t>
             </a:fld>
-            <a:endParaRPr lang="en-US"/>
+            <a:endParaRPr lang="en-US" dirty="0"/>
           </a:p>
         </p:txBody>
       </p:sp>
@@ -1409,9 +1409,9 @@
           <a:p>
             <a:fld id="{6FCE017E-20F9-AD48-8C62-632CB67C5F5C}" type="datetimeFigureOut">
               <a:rPr lang="en-US" smtClean="0"/>
-              <a:t>11/13/2021</a:t>
+              <a:t>11/14/2021</a:t>
             </a:fld>
-            <a:endParaRPr lang="en-US"/>
+            <a:endParaRPr lang="en-US" dirty="0"/>
           </a:p>
         </p:txBody>
       </p:sp>
@@ -1436,7 +1436,7 @@
           <a:bodyPr/>
           <a:lstStyle/>
           <a:p>
-            <a:endParaRPr lang="en-US"/>
+            <a:endParaRPr lang="en-US" dirty="0"/>
           </a:p>
         </p:txBody>
       </p:sp>
@@ -1465,7 +1465,7 @@
               <a:rPr lang="en-US" smtClean="0"/>
               <a:t>‹#›</a:t>
             </a:fld>
-            <a:endParaRPr lang="en-US"/>
+            <a:endParaRPr lang="en-US" dirty="0"/>
           </a:p>
         </p:txBody>
       </p:sp>
@@ -1821,9 +1821,9 @@
           <a:p>
             <a:fld id="{6FCE017E-20F9-AD48-8C62-632CB67C5F5C}" type="datetimeFigureOut">
               <a:rPr lang="en-US" smtClean="0"/>
-              <a:t>11/13/2021</a:t>
+              <a:t>11/14/2021</a:t>
             </a:fld>
-            <a:endParaRPr lang="en-US"/>
+            <a:endParaRPr lang="en-US" dirty="0"/>
           </a:p>
         </p:txBody>
       </p:sp>
@@ -1848,7 +1848,7 @@
           <a:bodyPr/>
           <a:lstStyle/>
           <a:p>
-            <a:endParaRPr lang="en-US"/>
+            <a:endParaRPr lang="en-US" dirty="0"/>
           </a:p>
         </p:txBody>
       </p:sp>
@@ -1877,7 +1877,7 @@
               <a:rPr lang="en-US" smtClean="0"/>
               <a:t>‹#›</a:t>
             </a:fld>
-            <a:endParaRPr lang="en-US"/>
+            <a:endParaRPr lang="en-US" dirty="0"/>
           </a:p>
         </p:txBody>
       </p:sp>
@@ -1962,9 +1962,9 @@
           <a:p>
             <a:fld id="{6FCE017E-20F9-AD48-8C62-632CB67C5F5C}" type="datetimeFigureOut">
               <a:rPr lang="en-US" smtClean="0"/>
-              <a:t>11/13/2021</a:t>
+              <a:t>11/14/2021</a:t>
             </a:fld>
-            <a:endParaRPr lang="en-US"/>
+            <a:endParaRPr lang="en-US" dirty="0"/>
           </a:p>
         </p:txBody>
       </p:sp>
@@ -1989,7 +1989,7 @@
           <a:bodyPr/>
           <a:lstStyle/>
           <a:p>
-            <a:endParaRPr lang="en-US"/>
+            <a:endParaRPr lang="en-US" dirty="0"/>
           </a:p>
         </p:txBody>
       </p:sp>
@@ -2018,7 +2018,7 @@
               <a:rPr lang="en-US" smtClean="0"/>
               <a:t>‹#›</a:t>
             </a:fld>
-            <a:endParaRPr lang="en-US"/>
+            <a:endParaRPr lang="en-US" dirty="0"/>
           </a:p>
         </p:txBody>
       </p:sp>
@@ -2075,9 +2075,9 @@
           <a:p>
             <a:fld id="{6FCE017E-20F9-AD48-8C62-632CB67C5F5C}" type="datetimeFigureOut">
               <a:rPr lang="en-US" smtClean="0"/>
-              <a:t>11/13/2021</a:t>
+              <a:t>11/14/2021</a:t>
             </a:fld>
-            <a:endParaRPr lang="en-US"/>
+            <a:endParaRPr lang="en-US" dirty="0"/>
           </a:p>
         </p:txBody>
       </p:sp>
@@ -2102,7 +2102,7 @@
           <a:bodyPr/>
           <a:lstStyle/>
           <a:p>
-            <a:endParaRPr lang="en-US"/>
+            <a:endParaRPr lang="en-US" dirty="0"/>
           </a:p>
         </p:txBody>
       </p:sp>
@@ -2131,7 +2131,7 @@
               <a:rPr lang="en-US" smtClean="0"/>
               <a:t>‹#›</a:t>
             </a:fld>
-            <a:endParaRPr lang="en-US"/>
+            <a:endParaRPr lang="en-US" dirty="0"/>
           </a:p>
         </p:txBody>
       </p:sp>
@@ -2386,9 +2386,9 @@
           <a:p>
             <a:fld id="{6FCE017E-20F9-AD48-8C62-632CB67C5F5C}" type="datetimeFigureOut">
               <a:rPr lang="en-US" smtClean="0"/>
-              <a:t>11/13/2021</a:t>
+              <a:t>11/14/2021</a:t>
             </a:fld>
-            <a:endParaRPr lang="en-US"/>
+            <a:endParaRPr lang="en-US" dirty="0"/>
           </a:p>
         </p:txBody>
       </p:sp>
@@ -2413,7 +2413,7 @@
           <a:bodyPr/>
           <a:lstStyle/>
           <a:p>
-            <a:endParaRPr lang="en-US"/>
+            <a:endParaRPr lang="en-US" dirty="0"/>
           </a:p>
         </p:txBody>
       </p:sp>
@@ -2442,7 +2442,7 @@
               <a:rPr lang="en-US" smtClean="0"/>
               <a:t>‹#›</a:t>
             </a:fld>
-            <a:endParaRPr lang="en-US"/>
+            <a:endParaRPr lang="en-US" dirty="0"/>
           </a:p>
         </p:txBody>
       </p:sp>
@@ -2576,7 +2576,7 @@
             </a:lvl9pPr>
           </a:lstStyle>
           <a:p>
-            <a:endParaRPr lang="en-US"/>
+            <a:endParaRPr lang="en-US" dirty="0"/>
           </a:p>
         </p:txBody>
       </p:sp>
@@ -2674,9 +2674,9 @@
           <a:p>
             <a:fld id="{6FCE017E-20F9-AD48-8C62-632CB67C5F5C}" type="datetimeFigureOut">
               <a:rPr lang="en-US" smtClean="0"/>
-              <a:t>11/13/2021</a:t>
+              <a:t>11/14/2021</a:t>
             </a:fld>
-            <a:endParaRPr lang="en-US"/>
+            <a:endParaRPr lang="en-US" dirty="0"/>
           </a:p>
         </p:txBody>
       </p:sp>
@@ -2701,7 +2701,7 @@
           <a:bodyPr/>
           <a:lstStyle/>
           <a:p>
-            <a:endParaRPr lang="en-US"/>
+            <a:endParaRPr lang="en-US" dirty="0"/>
           </a:p>
         </p:txBody>
       </p:sp>
@@ -2730,7 +2730,7 @@
               <a:rPr lang="en-US" smtClean="0"/>
               <a:t>‹#›</a:t>
             </a:fld>
-            <a:endParaRPr lang="en-US"/>
+            <a:endParaRPr lang="en-US" dirty="0"/>
           </a:p>
         </p:txBody>
       </p:sp>
@@ -2915,9 +2915,9 @@
           <a:p>
             <a:fld id="{6FCE017E-20F9-AD48-8C62-632CB67C5F5C}" type="datetimeFigureOut">
               <a:rPr lang="en-US" smtClean="0"/>
-              <a:t>11/13/2021</a:t>
+              <a:t>11/14/2021</a:t>
             </a:fld>
-            <a:endParaRPr lang="en-US"/>
+            <a:endParaRPr lang="en-US" dirty="0"/>
           </a:p>
         </p:txBody>
       </p:sp>
@@ -2960,7 +2960,7 @@
             </a:lvl1pPr>
           </a:lstStyle>
           <a:p>
-            <a:endParaRPr lang="en-US"/>
+            <a:endParaRPr lang="en-US" dirty="0"/>
           </a:p>
         </p:txBody>
       </p:sp>
@@ -3007,7 +3007,7 @@
               <a:rPr lang="en-US" smtClean="0"/>
               <a:t>‹#›</a:t>
             </a:fld>
-            <a:endParaRPr lang="en-US"/>
+            <a:endParaRPr lang="en-US" dirty="0"/>
           </a:p>
         </p:txBody>
       </p:sp>
@@ -3381,7 +3381,16 @@
           <a:bodyPr/>
           <a:lstStyle/>
           <a:p>
-            <a:endParaRPr lang="en-US"/>
+            <a:r>
+              <a:rPr lang="en-US" dirty="0"/>
+              <a:t>Which variables are most important to predicting the price of housing?</a:t>
+            </a:r>
+          </a:p>
+          <a:p>
+            <a:r>
+              <a:rPr lang="en-US" dirty="0"/>
+              <a:t>An analysis by Simran Kota and Yusef Haswarey</a:t>
+            </a:r>
           </a:p>
         </p:txBody>
       </p:sp>
@@ -3601,6 +3610,13 @@
             </a:r>
           </a:p>
           <a:p>
+            <a:pPr lvl="1"/>
+            <a:r>
+              <a:rPr lang="en-US" dirty="0"/>
+              <a:t>Predictors where neither option would work well were excluded</a:t>
+            </a:r>
+          </a:p>
+          <a:p>
             <a:r>
               <a:rPr lang="en-US" dirty="0"/>
               <a:t>Outcome variable is somewhat normally distributed with outliers – right skewed</a:t>
@@ -3684,50 +3700,39 @@
         </p:nvSpPr>
         <p:spPr/>
         <p:txBody>
-          <a:bodyPr/>
+          <a:bodyPr>
+            <a:normAutofit/>
+          </a:bodyPr>
           <a:lstStyle/>
           <a:p>
             <a:r>
               <a:rPr lang="en-US" dirty="0"/>
-              <a:t>Large collection of uncorrelated decision trees using random subsets of decision variables and observations</a:t>
+              <a:t>Large collection of uncorrelated decision trees using random subsets of predictor variables and observations</a:t>
             </a:r>
           </a:p>
           <a:p>
             <a:r>
               <a:rPr lang="en-US" dirty="0"/>
-              <a:t>No preprocessing or specific data requirements – can be used for classification or regression</a:t>
+              <a:t>No preprocessing or specific data requirements – can be used for classification or regression, but is slow when used on large datasets</a:t>
             </a:r>
           </a:p>
           <a:p>
             <a:r>
               <a:rPr lang="en-US" dirty="0"/>
-              <a:t>BUT performance slows with larger datasets</a:t>
+              <a:t>Is a predictive modeling method, not a descriptive modeling method</a:t>
             </a:r>
           </a:p>
           <a:p>
             <a:r>
               <a:rPr lang="en-US" dirty="0"/>
-              <a:t>Basic implementation using </a:t>
-            </a:r>
-            <a:r>
-              <a:rPr lang="en-US" dirty="0" err="1"/>
-              <a:t>randomForest</a:t>
-            </a:r>
+              <a:t>Basic implementation using randomForest package – we used this package for our analysis</a:t>
+            </a:r>
+          </a:p>
+          <a:p>
             <a:r>
               <a:rPr lang="en-US" dirty="0"/>
-              <a:t> package – this is what we used</a:t>
-            </a:r>
-          </a:p>
-          <a:p>
-            <a:r>
-              <a:rPr lang="en-US" dirty="0"/>
-              <a:t>Package features built-in cross-validation – keeps some observations out-of-bag for </a:t>
-            </a:r>
-            <a:r>
-              <a:rPr lang="en-US"/>
-              <a:t>validation purposes</a:t>
-            </a:r>
-            <a:endParaRPr lang="en-US" dirty="0"/>
+              <a:t>Package features built-in cross-validation – keeps some observations out-of-bag (OOB) for validation purposes</a:t>
+            </a:r>
           </a:p>
         </p:txBody>
       </p:sp>
@@ -3810,7 +3815,22 @@
           <a:bodyPr/>
           <a:lstStyle/>
           <a:p>
-            <a:endParaRPr lang="en-US"/>
+            <a:r>
+              <a:rPr lang="en-US" dirty="0"/>
+              <a:t>Any dataset appropriate for use with a classification or regression method can be used with Random Forest</a:t>
+            </a:r>
+          </a:p>
+          <a:p>
+            <a:r>
+              <a:rPr lang="en-US" dirty="0"/>
+              <a:t>Random Forest may not be the best method for a given application</a:t>
+            </a:r>
+          </a:p>
+          <a:p>
+            <a:r>
+              <a:rPr lang="en-US" dirty="0"/>
+              <a:t>Excessively large datasets or time-sensitive applications may require the use of other methods for generating predictions</a:t>
+            </a:r>
           </a:p>
         </p:txBody>
       </p:sp>
@@ -3893,7 +3913,28 @@
           <a:bodyPr/>
           <a:lstStyle/>
           <a:p>
-            <a:endParaRPr lang="en-US"/>
+            <a:r>
+              <a:rPr lang="en-US" dirty="0"/>
+              <a:t>Due to its good performance without any tuning, our initial model call included only the formula (SalePrice ~ .) and the full dataset</a:t>
+            </a:r>
+          </a:p>
+          <a:p>
+            <a:r>
+              <a:rPr lang="en-US" dirty="0"/>
+              <a:t>We also manually split the dataset into a training and validation set to perform our own manual validation of the predictive model</a:t>
+            </a:r>
+          </a:p>
+          <a:p>
+            <a:r>
+              <a:rPr lang="en-US" dirty="0"/>
+              <a:t>The model function also allows specification of a test dataset – used to perform additional validation alongside OOB set</a:t>
+            </a:r>
+          </a:p>
+          <a:p>
+            <a:r>
+              <a:rPr lang="en-US" dirty="0"/>
+              <a:t>Randomness in selection of training set and building of decision trees leads to variance in predictions between models</a:t>
+            </a:r>
           </a:p>
         </p:txBody>
       </p:sp>
@@ -3976,7 +4017,28 @@
           <a:bodyPr/>
           <a:lstStyle/>
           <a:p>
-            <a:endParaRPr lang="en-US"/>
+            <a:r>
+              <a:rPr lang="en-US" dirty="0"/>
+              <a:t>In each model, overall quality was most important predictor variable</a:t>
+            </a:r>
+          </a:p>
+          <a:p>
+            <a:r>
+              <a:rPr lang="en-US" dirty="0"/>
+              <a:t>Remaining 9 of top 10 predictors saw few changes between models</a:t>
+            </a:r>
+          </a:p>
+          <a:p>
+            <a:r>
+              <a:rPr lang="en-US" dirty="0"/>
+              <a:t>Root mean square prediction error around $25k – 30k range for each</a:t>
+            </a:r>
+          </a:p>
+          <a:p>
+            <a:r>
+              <a:rPr lang="en-US" dirty="0"/>
+              <a:t>This includes the error for both the manual validation and OOB sets</a:t>
+            </a:r>
           </a:p>
         </p:txBody>
       </p:sp>

</xml_diff>